<commit_message>
Fixed font and background color comparison issues + more test files
</commit_message>
<xml_diff>
--- a/UnitTests/ComparingMethodsTest/TestFiles/FontComparison/Original/12_p.pptx
+++ b/UnitTests/ComparingMethodsTest/TestFiles/FontComparison/Original/12_p.pptx
@@ -264,7 +264,7 @@
           <a:p>
             <a:fld id="{C1F6139A-E09C-487E-89B7-2481159F71B2}" type="datetimeFigureOut">
               <a:rPr lang="nb-NO" smtClean="0"/>
-              <a:t>21.03.2025</a:t>
+              <a:t>27.03.2025</a:t>
             </a:fld>
             <a:endParaRPr lang="nb-NO"/>
           </a:p>
@@ -464,7 +464,7 @@
           <a:p>
             <a:fld id="{C1F6139A-E09C-487E-89B7-2481159F71B2}" type="datetimeFigureOut">
               <a:rPr lang="nb-NO" smtClean="0"/>
-              <a:t>21.03.2025</a:t>
+              <a:t>27.03.2025</a:t>
             </a:fld>
             <a:endParaRPr lang="nb-NO"/>
           </a:p>
@@ -674,7 +674,7 @@
           <a:p>
             <a:fld id="{C1F6139A-E09C-487E-89B7-2481159F71B2}" type="datetimeFigureOut">
               <a:rPr lang="nb-NO" smtClean="0"/>
-              <a:t>21.03.2025</a:t>
+              <a:t>27.03.2025</a:t>
             </a:fld>
             <a:endParaRPr lang="nb-NO"/>
           </a:p>
@@ -896,7 +896,7 @@
           <a:p>
             <a:fld id="{75A4CA9F-8ACF-44C9-AA3B-B865E9BBCC76}" type="datetimeFigureOut">
               <a:rPr lang="nb-NO" smtClean="0"/>
-              <a:t>21.03.2025</a:t>
+              <a:t>27.03.2025</a:t>
             </a:fld>
             <a:endParaRPr lang="nb-NO"/>
           </a:p>
@@ -1096,7 +1096,7 @@
           <a:p>
             <a:fld id="{75A4CA9F-8ACF-44C9-AA3B-B865E9BBCC76}" type="datetimeFigureOut">
               <a:rPr lang="nb-NO" smtClean="0"/>
-              <a:t>21.03.2025</a:t>
+              <a:t>27.03.2025</a:t>
             </a:fld>
             <a:endParaRPr lang="nb-NO"/>
           </a:p>
@@ -1372,7 +1372,7 @@
           <a:p>
             <a:fld id="{75A4CA9F-8ACF-44C9-AA3B-B865E9BBCC76}" type="datetimeFigureOut">
               <a:rPr lang="nb-NO" smtClean="0"/>
-              <a:t>21.03.2025</a:t>
+              <a:t>27.03.2025</a:t>
             </a:fld>
             <a:endParaRPr lang="nb-NO"/>
           </a:p>
@@ -1640,7 +1640,7 @@
           <a:p>
             <a:fld id="{75A4CA9F-8ACF-44C9-AA3B-B865E9BBCC76}" type="datetimeFigureOut">
               <a:rPr lang="nb-NO" smtClean="0"/>
-              <a:t>21.03.2025</a:t>
+              <a:t>27.03.2025</a:t>
             </a:fld>
             <a:endParaRPr lang="nb-NO"/>
           </a:p>
@@ -2055,7 +2055,7 @@
           <a:p>
             <a:fld id="{75A4CA9F-8ACF-44C9-AA3B-B865E9BBCC76}" type="datetimeFigureOut">
               <a:rPr lang="nb-NO" smtClean="0"/>
-              <a:t>21.03.2025</a:t>
+              <a:t>27.03.2025</a:t>
             </a:fld>
             <a:endParaRPr lang="nb-NO"/>
           </a:p>
@@ -2197,7 +2197,7 @@
           <a:p>
             <a:fld id="{75A4CA9F-8ACF-44C9-AA3B-B865E9BBCC76}" type="datetimeFigureOut">
               <a:rPr lang="nb-NO" smtClean="0"/>
-              <a:t>21.03.2025</a:t>
+              <a:t>27.03.2025</a:t>
             </a:fld>
             <a:endParaRPr lang="nb-NO"/>
           </a:p>
@@ -2310,7 +2310,7 @@
           <a:p>
             <a:fld id="{75A4CA9F-8ACF-44C9-AA3B-B865E9BBCC76}" type="datetimeFigureOut">
               <a:rPr lang="nb-NO" smtClean="0"/>
-              <a:t>21.03.2025</a:t>
+              <a:t>27.03.2025</a:t>
             </a:fld>
             <a:endParaRPr lang="nb-NO"/>
           </a:p>
@@ -2623,7 +2623,7 @@
           <a:p>
             <a:fld id="{75A4CA9F-8ACF-44C9-AA3B-B865E9BBCC76}" type="datetimeFigureOut">
               <a:rPr lang="nb-NO" smtClean="0"/>
-              <a:t>21.03.2025</a:t>
+              <a:t>27.03.2025</a:t>
             </a:fld>
             <a:endParaRPr lang="nb-NO"/>
           </a:p>
@@ -2823,7 +2823,7 @@
           <a:p>
             <a:fld id="{C1F6139A-E09C-487E-89B7-2481159F71B2}" type="datetimeFigureOut">
               <a:rPr lang="nb-NO" smtClean="0"/>
-              <a:t>21.03.2025</a:t>
+              <a:t>27.03.2025</a:t>
             </a:fld>
             <a:endParaRPr lang="nb-NO"/>
           </a:p>
@@ -3112,7 +3112,7 @@
           <a:p>
             <a:fld id="{75A4CA9F-8ACF-44C9-AA3B-B865E9BBCC76}" type="datetimeFigureOut">
               <a:rPr lang="nb-NO" smtClean="0"/>
-              <a:t>21.03.2025</a:t>
+              <a:t>27.03.2025</a:t>
             </a:fld>
             <a:endParaRPr lang="nb-NO"/>
           </a:p>
@@ -3312,7 +3312,7 @@
           <a:p>
             <a:fld id="{75A4CA9F-8ACF-44C9-AA3B-B865E9BBCC76}" type="datetimeFigureOut">
               <a:rPr lang="nb-NO" smtClean="0"/>
-              <a:t>21.03.2025</a:t>
+              <a:t>27.03.2025</a:t>
             </a:fld>
             <a:endParaRPr lang="nb-NO"/>
           </a:p>
@@ -3522,7 +3522,7 @@
           <a:p>
             <a:fld id="{75A4CA9F-8ACF-44C9-AA3B-B865E9BBCC76}" type="datetimeFigureOut">
               <a:rPr lang="nb-NO" smtClean="0"/>
-              <a:t>21.03.2025</a:t>
+              <a:t>27.03.2025</a:t>
             </a:fld>
             <a:endParaRPr lang="nb-NO"/>
           </a:p>
@@ -3781,7 +3781,7 @@
           <a:p>
             <a:fld id="{75A4CA9F-8ACF-44C9-AA3B-B865E9BBCC76}" type="datetimeFigureOut">
               <a:rPr lang="nb-NO" smtClean="0"/>
-              <a:t>21.03.2025</a:t>
+              <a:t>27.03.2025</a:t>
             </a:fld>
             <a:endParaRPr lang="nb-NO"/>
           </a:p>
@@ -3951,7 +3951,7 @@
           <a:p>
             <a:fld id="{75A4CA9F-8ACF-44C9-AA3B-B865E9BBCC76}" type="datetimeFigureOut">
               <a:rPr lang="nb-NO" smtClean="0"/>
-              <a:t>21.03.2025</a:t>
+              <a:t>27.03.2025</a:t>
             </a:fld>
             <a:endParaRPr lang="nb-NO"/>
           </a:p>
@@ -4198,7 +4198,7 @@
           <a:p>
             <a:fld id="{75A4CA9F-8ACF-44C9-AA3B-B865E9BBCC76}" type="datetimeFigureOut">
               <a:rPr lang="nb-NO" smtClean="0"/>
-              <a:t>21.03.2025</a:t>
+              <a:t>27.03.2025</a:t>
             </a:fld>
             <a:endParaRPr lang="nb-NO"/>
           </a:p>
@@ -4490,7 +4490,7 @@
           <a:p>
             <a:fld id="{75A4CA9F-8ACF-44C9-AA3B-B865E9BBCC76}" type="datetimeFigureOut">
               <a:rPr lang="nb-NO" smtClean="0"/>
-              <a:t>21.03.2025</a:t>
+              <a:t>27.03.2025</a:t>
             </a:fld>
             <a:endParaRPr lang="nb-NO"/>
           </a:p>
@@ -4934,7 +4934,7 @@
           <a:p>
             <a:fld id="{75A4CA9F-8ACF-44C9-AA3B-B865E9BBCC76}" type="datetimeFigureOut">
               <a:rPr lang="nb-NO" smtClean="0"/>
-              <a:t>21.03.2025</a:t>
+              <a:t>27.03.2025</a:t>
             </a:fld>
             <a:endParaRPr lang="nb-NO"/>
           </a:p>
@@ -5052,7 +5052,7 @@
           <a:p>
             <a:fld id="{75A4CA9F-8ACF-44C9-AA3B-B865E9BBCC76}" type="datetimeFigureOut">
               <a:rPr lang="nb-NO" smtClean="0"/>
-              <a:t>21.03.2025</a:t>
+              <a:t>27.03.2025</a:t>
             </a:fld>
             <a:endParaRPr lang="nb-NO"/>
           </a:p>
@@ -5147,7 +5147,7 @@
           <a:p>
             <a:fld id="{75A4CA9F-8ACF-44C9-AA3B-B865E9BBCC76}" type="datetimeFigureOut">
               <a:rPr lang="nb-NO" smtClean="0"/>
-              <a:t>21.03.2025</a:t>
+              <a:t>27.03.2025</a:t>
             </a:fld>
             <a:endParaRPr lang="nb-NO"/>
           </a:p>
@@ -5411,7 +5411,7 @@
           <a:p>
             <a:fld id="{C1F6139A-E09C-487E-89B7-2481159F71B2}" type="datetimeFigureOut">
               <a:rPr lang="nb-NO" smtClean="0"/>
-              <a:t>21.03.2025</a:t>
+              <a:t>27.03.2025</a:t>
             </a:fld>
             <a:endParaRPr lang="nb-NO"/>
           </a:p>
@@ -5702,7 +5702,7 @@
           <a:p>
             <a:fld id="{75A4CA9F-8ACF-44C9-AA3B-B865E9BBCC76}" type="datetimeFigureOut">
               <a:rPr lang="nb-NO" smtClean="0"/>
-              <a:t>21.03.2025</a:t>
+              <a:t>27.03.2025</a:t>
             </a:fld>
             <a:endParaRPr lang="nb-NO"/>
           </a:p>
@@ -5977,7 +5977,7 @@
           <a:p>
             <a:fld id="{75A4CA9F-8ACF-44C9-AA3B-B865E9BBCC76}" type="datetimeFigureOut">
               <a:rPr lang="nb-NO" smtClean="0"/>
-              <a:t>21.03.2025</a:t>
+              <a:t>27.03.2025</a:t>
             </a:fld>
             <a:endParaRPr lang="nb-NO"/>
           </a:p>
@@ -6252,7 +6252,7 @@
           <a:p>
             <a:fld id="{75A4CA9F-8ACF-44C9-AA3B-B865E9BBCC76}" type="datetimeFigureOut">
               <a:rPr lang="nb-NO" smtClean="0"/>
-              <a:t>21.03.2025</a:t>
+              <a:t>27.03.2025</a:t>
             </a:fld>
             <a:endParaRPr lang="nb-NO"/>
           </a:p>
@@ -6446,7 +6446,7 @@
           <a:p>
             <a:fld id="{75A4CA9F-8ACF-44C9-AA3B-B865E9BBCC76}" type="datetimeFigureOut">
               <a:rPr lang="nb-NO" smtClean="0"/>
-              <a:t>21.03.2025</a:t>
+              <a:t>27.03.2025</a:t>
             </a:fld>
             <a:endParaRPr lang="nb-NO"/>
           </a:p>
@@ -6719,7 +6719,7 @@
           <a:p>
             <a:fld id="{75A4CA9F-8ACF-44C9-AA3B-B865E9BBCC76}" type="datetimeFigureOut">
               <a:rPr lang="nb-NO" smtClean="0"/>
-              <a:t>21.03.2025</a:t>
+              <a:t>27.03.2025</a:t>
             </a:fld>
             <a:endParaRPr lang="nb-NO"/>
           </a:p>
@@ -7060,7 +7060,7 @@
           <a:p>
             <a:fld id="{75A4CA9F-8ACF-44C9-AA3B-B865E9BBCC76}" type="datetimeFigureOut">
               <a:rPr lang="nb-NO" smtClean="0"/>
-              <a:t>21.03.2025</a:t>
+              <a:t>27.03.2025</a:t>
             </a:fld>
             <a:endParaRPr lang="nb-NO"/>
           </a:p>
@@ -7683,7 +7683,7 @@
           <a:p>
             <a:fld id="{75A4CA9F-8ACF-44C9-AA3B-B865E9BBCC76}" type="datetimeFigureOut">
               <a:rPr lang="nb-NO" smtClean="0"/>
-              <a:t>21.03.2025</a:t>
+              <a:t>27.03.2025</a:t>
             </a:fld>
             <a:endParaRPr lang="nb-NO"/>
           </a:p>
@@ -8543,7 +8543,7 @@
           <a:p>
             <a:fld id="{75A4CA9F-8ACF-44C9-AA3B-B865E9BBCC76}" type="datetimeFigureOut">
               <a:rPr lang="nb-NO" smtClean="0"/>
-              <a:t>21.03.2025</a:t>
+              <a:t>27.03.2025</a:t>
             </a:fld>
             <a:endParaRPr lang="nb-NO"/>
           </a:p>
@@ -8713,7 +8713,7 @@
           <a:p>
             <a:fld id="{75A4CA9F-8ACF-44C9-AA3B-B865E9BBCC76}" type="datetimeFigureOut">
               <a:rPr lang="nb-NO" smtClean="0"/>
-              <a:t>21.03.2025</a:t>
+              <a:t>27.03.2025</a:t>
             </a:fld>
             <a:endParaRPr lang="nb-NO"/>
           </a:p>
@@ -8893,7 +8893,7 @@
           <a:p>
             <a:fld id="{75A4CA9F-8ACF-44C9-AA3B-B865E9BBCC76}" type="datetimeFigureOut">
               <a:rPr lang="nb-NO" smtClean="0"/>
-              <a:t>21.03.2025</a:t>
+              <a:t>27.03.2025</a:t>
             </a:fld>
             <a:endParaRPr lang="nb-NO"/>
           </a:p>
@@ -9149,7 +9149,7 @@
           <a:p>
             <a:fld id="{C1F6139A-E09C-487E-89B7-2481159F71B2}" type="datetimeFigureOut">
               <a:rPr lang="nb-NO" smtClean="0"/>
-              <a:t>21.03.2025</a:t>
+              <a:t>27.03.2025</a:t>
             </a:fld>
             <a:endParaRPr lang="nb-NO"/>
           </a:p>
@@ -9564,7 +9564,7 @@
           <a:p>
             <a:fld id="{C1F6139A-E09C-487E-89B7-2481159F71B2}" type="datetimeFigureOut">
               <a:rPr lang="nb-NO" smtClean="0"/>
-              <a:t>21.03.2025</a:t>
+              <a:t>27.03.2025</a:t>
             </a:fld>
             <a:endParaRPr lang="nb-NO"/>
           </a:p>
@@ -9706,7 +9706,7 @@
           <a:p>
             <a:fld id="{C1F6139A-E09C-487E-89B7-2481159F71B2}" type="datetimeFigureOut">
               <a:rPr lang="nb-NO" smtClean="0"/>
-              <a:t>21.03.2025</a:t>
+              <a:t>27.03.2025</a:t>
             </a:fld>
             <a:endParaRPr lang="nb-NO"/>
           </a:p>
@@ -9819,7 +9819,7 @@
           <a:p>
             <a:fld id="{C1F6139A-E09C-487E-89B7-2481159F71B2}" type="datetimeFigureOut">
               <a:rPr lang="nb-NO" smtClean="0"/>
-              <a:t>21.03.2025</a:t>
+              <a:t>27.03.2025</a:t>
             </a:fld>
             <a:endParaRPr lang="nb-NO"/>
           </a:p>
@@ -10132,7 +10132,7 @@
           <a:p>
             <a:fld id="{C1F6139A-E09C-487E-89B7-2481159F71B2}" type="datetimeFigureOut">
               <a:rPr lang="nb-NO" smtClean="0"/>
-              <a:t>21.03.2025</a:t>
+              <a:t>27.03.2025</a:t>
             </a:fld>
             <a:endParaRPr lang="nb-NO"/>
           </a:p>
@@ -10421,7 +10421,7 @@
           <a:p>
             <a:fld id="{C1F6139A-E09C-487E-89B7-2481159F71B2}" type="datetimeFigureOut">
               <a:rPr lang="nb-NO" smtClean="0"/>
-              <a:t>21.03.2025</a:t>
+              <a:t>27.03.2025</a:t>
             </a:fld>
             <a:endParaRPr lang="nb-NO"/>
           </a:p>
@@ -10664,7 +10664,7 @@
           <a:p>
             <a:fld id="{C1F6139A-E09C-487E-89B7-2481159F71B2}" type="datetimeFigureOut">
               <a:rPr lang="nb-NO" smtClean="0"/>
-              <a:t>21.03.2025</a:t>
+              <a:t>27.03.2025</a:t>
             </a:fld>
             <a:endParaRPr lang="nb-NO"/>
           </a:p>
@@ -11234,7 +11234,7 @@
           <a:p>
             <a:fld id="{75A4CA9F-8ACF-44C9-AA3B-B865E9BBCC76}" type="datetimeFigureOut">
               <a:rPr lang="nb-NO" smtClean="0"/>
-              <a:t>21.03.2025</a:t>
+              <a:t>27.03.2025</a:t>
             </a:fld>
             <a:endParaRPr lang="nb-NO"/>
           </a:p>
@@ -12001,7 +12001,7 @@
           <a:p>
             <a:fld id="{C1F6139A-E09C-487E-89B7-2481159F71B2}" type="datetimeFigureOut">
               <a:rPr lang="nb-NO" smtClean="0"/>
-              <a:t>21.03.2025</a:t>
+              <a:t>27.03.2025</a:t>
             </a:fld>
             <a:endParaRPr lang="nb-NO"/>
           </a:p>
@@ -12712,6 +12712,18 @@
               </a:rPr>
               <a:t>Highlight</a:t>
             </a:r>
+            <a:endParaRPr lang="nb-NO" dirty="0">
+              <a:solidFill>
+                <a:schemeClr val="bg1"/>
+              </a:solidFill>
+              <a:highlight>
+                <a:srgbClr val="800080"/>
+              </a:highlight>
+              <a:latin typeface="Times New Roman" panose="02020603050405020304" pitchFamily="18" charset="0"/>
+              <a:cs typeface="Times New Roman" panose="02020603050405020304" pitchFamily="18" charset="0"/>
+            </a:endParaRPr>
+          </a:p>
+          <a:p>
             <a:endParaRPr lang="nb-NO" dirty="0">
               <a:solidFill>
                 <a:schemeClr val="bg1"/>

</xml_diff>